<commit_message>
Add Github link in PPTX
</commit_message>
<xml_diff>
--- a/NLP Presentation.pptx
+++ b/NLP Presentation.pptx
@@ -11108,7 +11108,7 @@
         </p:nvSpPr>
         <p:spPr>
           <a:xfrm>
-            <a:off x="1052550" y="2114700"/>
+            <a:off x="1052550" y="1414025"/>
             <a:ext cx="7038900" cy="914100"/>
           </a:xfrm>
           <a:prstGeom prst="rect">
@@ -11135,6 +11135,56 @@
               <a:t>Thanks for listening !</a:t>
             </a:r>
             <a:endParaRPr/>
+          </a:p>
+        </p:txBody>
+      </p:sp>
+      <p:sp>
+        <p:nvSpPr>
+          <p:cNvPr id="189" name="Google Shape;189;p21"/>
+          <p:cNvSpPr txBox="1"/>
+          <p:nvPr/>
+        </p:nvSpPr>
+        <p:spPr>
+          <a:xfrm>
+            <a:off x="1506600" y="2508050"/>
+            <a:ext cx="6130800" cy="1186500"/>
+          </a:xfrm>
+          <a:prstGeom prst="rect">
+            <a:avLst/>
+          </a:prstGeom>
+          <a:noFill/>
+          <a:ln>
+            <a:noFill/>
+          </a:ln>
+        </p:spPr>
+        <p:txBody>
+          <a:bodyPr anchorCtr="0" anchor="t" bIns="91425" lIns="91425" spcFirstLastPara="1" rIns="91425" wrap="square" tIns="91425">
+            <a:noAutofit/>
+          </a:bodyPr>
+          <a:lstStyle/>
+          <a:p>
+            <a:pPr indent="0" lvl="0" marL="0" rtl="0" algn="ctr">
+              <a:spcBef>
+                <a:spcPts val="0"/>
+              </a:spcBef>
+              <a:spcAft>
+                <a:spcPts val="0"/>
+              </a:spcAft>
+              <a:buNone/>
+            </a:pPr>
+            <a:r>
+              <a:rPr lang="fr">
+                <a:solidFill>
+                  <a:srgbClr val="FFFFFF"/>
+                </a:solidFill>
+              </a:rPr>
+              <a:t>https://github.com/PabloBerenguel/CAu-Natural-language-processing</a:t>
+            </a:r>
+            <a:endParaRPr>
+              <a:solidFill>
+                <a:srgbClr val="FFFFFF"/>
+              </a:solidFill>
+            </a:endParaRPr>
           </a:p>
         </p:txBody>
       </p:sp>

</xml_diff>